<commit_message>
Update cheatsheet (Powerpoint and PDF)
- Change `textmodel_NB()` to `textmodel_nb()`
- Change `nfeature()` to `nfeat()`
- Fix typo
</commit_message>
<xml_diff>
--- a/tests/cheatsheet/quanteda-cheatsheet.pptx
+++ b/tests/cheatsheet/quanteda-cheatsheet.pptx
@@ -6445,15 +6445,31 @@
           <a:p>
             <a:pPr algn="l"/>
             <a:r>
+              <a:rPr lang="en-US" sz="1300" smtClean="0">
+                <a:solidFill>
+                  <a:srgbClr val="006AC7"/>
+                </a:solidFill>
+                <a:latin typeface="Monaco" charset="0"/>
+                <a:ea typeface="Monaco" charset="0"/>
+                <a:cs typeface="Monaco" charset="0"/>
+              </a:rPr>
+              <a:t>nfeat</a:t>
+            </a:r>
+            <a:r>
+              <a:rPr lang="en-US" sz="1300" smtClean="0">
+                <a:latin typeface="Monaco" charset="0"/>
+                <a:ea typeface="Monaco" charset="0"/>
+                <a:cs typeface="Monaco" charset="0"/>
+              </a:rPr>
+              <a:t>(corpus/</a:t>
+            </a:r>
+            <a:r>
               <a:rPr lang="en-US" sz="1300" dirty="0" err="1" smtClean="0">
-                <a:solidFill>
-                  <a:srgbClr val="006AC7"/>
-                </a:solidFill>
-                <a:latin typeface="Monaco" charset="0"/>
-                <a:ea typeface="Monaco" charset="0"/>
-                <a:cs typeface="Monaco" charset="0"/>
-              </a:rPr>
-              <a:t>nfeature</a:t>
+                <a:latin typeface="Monaco" charset="0"/>
+                <a:ea typeface="Monaco" charset="0"/>
+                <a:cs typeface="Monaco" charset="0"/>
+              </a:rPr>
+              <a:t>dfm</a:t>
             </a:r>
             <a:r>
               <a:rPr lang="en-US" sz="1300" dirty="0" smtClean="0">
@@ -6461,15 +6477,7 @@
                 <a:ea typeface="Monaco" charset="0"/>
                 <a:cs typeface="Monaco" charset="0"/>
               </a:rPr>
-              <a:t>(corpus/</a:t>
-            </a:r>
-            <a:r>
-              <a:rPr lang="en-US" sz="1300" dirty="0" err="1" smtClean="0">
-                <a:latin typeface="Monaco" charset="0"/>
-                <a:ea typeface="Monaco" charset="0"/>
-                <a:cs typeface="Monaco" charset="0"/>
-              </a:rPr>
-              <a:t>dfm</a:t>
+              <a:t>/tokens)</a:t>
             </a:r>
             <a:r>
               <a:rPr lang="en-US" sz="1300" dirty="0" smtClean="0">
@@ -6477,7 +6485,7 @@
                 <a:ea typeface="Monaco" charset="0"/>
                 <a:cs typeface="Monaco" charset="0"/>
               </a:rPr>
-              <a:t>/tokens)	</a:t>
+              <a:t>	</a:t>
             </a:r>
             <a:r>
               <a:rPr lang="en-US" sz="1300" i="1" dirty="0" smtClean="0">
@@ -7181,7 +7189,7 @@
                 <a:ea typeface="Monaco" charset="0"/>
                 <a:cs typeface="Monaco" charset="0"/>
               </a:rPr>
-              <a:t>textmodel_NB</a:t>
+              <a:t>textmodel_nb</a:t>
             </a:r>
             <a:r>
               <a:rPr lang="en-GB" sz="1300" dirty="0" smtClean="0">
@@ -7192,7 +7200,18 @@
                 <a:ea typeface="Monaco" charset="0"/>
                 <a:cs typeface="Monaco" charset="0"/>
               </a:rPr>
-              <a:t>(x, </a:t>
+              <a:t>(x</a:t>
+            </a:r>
+            <a:r>
+              <a:rPr lang="en-GB" sz="1300" dirty="0" smtClean="0">
+                <a:solidFill>
+                  <a:schemeClr val="tx1"/>
+                </a:solidFill>
+                <a:latin typeface="Monaco" charset="0"/>
+                <a:ea typeface="Monaco" charset="0"/>
+                <a:cs typeface="Monaco" charset="0"/>
+              </a:rPr>
+              <a:t>, </a:t>
             </a:r>
             <a:r>
               <a:rPr lang="en-GB" sz="1300" dirty="0">

</xml_diff>